<commit_message>
Update LogicClassDiagram UML to remove IncorrectCommand
IncorrectCommand is no longer in the codebase.

Let's change it to another command that still exist on the codebase
(i.e. HelpCommand).
</commit_message>
<xml_diff>
--- a/docs/diagrams/LogicComponentClassDiagram.pptx
+++ b/docs/diagrams/LogicComponentClassDiagram.pptx
@@ -208,7 +208,7 @@
           <a:p>
             <a:fld id="{F5CC4B3F-88C1-4FFA-B1B6-F41C21DC6924}" type="datetimeFigureOut">
               <a:rPr lang="en-US" smtClean="0"/>
-              <a:t>3/21/2017</a:t>
+              <a:t>5/31/2017</a:t>
             </a:fld>
             <a:endParaRPr lang="en-US"/>
           </a:p>
@@ -654,7 +654,7 @@
           <a:p>
             <a:fld id="{78C97017-6FC3-485B-9764-EAC9E56C1D49}" type="datetimeFigureOut">
               <a:rPr lang="en-US" smtClean="0"/>
-              <a:t>3/21/2017</a:t>
+              <a:t>5/31/2017</a:t>
             </a:fld>
             <a:endParaRPr lang="en-US"/>
           </a:p>
@@ -822,7 +822,7 @@
           <a:p>
             <a:fld id="{78C97017-6FC3-485B-9764-EAC9E56C1D49}" type="datetimeFigureOut">
               <a:rPr lang="en-US" smtClean="0"/>
-              <a:t>3/21/2017</a:t>
+              <a:t>5/31/2017</a:t>
             </a:fld>
             <a:endParaRPr lang="en-US"/>
           </a:p>
@@ -1000,7 +1000,7 @@
           <a:p>
             <a:fld id="{78C97017-6FC3-485B-9764-EAC9E56C1D49}" type="datetimeFigureOut">
               <a:rPr lang="en-US" smtClean="0"/>
-              <a:t>3/21/2017</a:t>
+              <a:t>5/31/2017</a:t>
             </a:fld>
             <a:endParaRPr lang="en-US"/>
           </a:p>
@@ -1168,7 +1168,7 @@
           <a:p>
             <a:fld id="{78C97017-6FC3-485B-9764-EAC9E56C1D49}" type="datetimeFigureOut">
               <a:rPr lang="en-US" smtClean="0"/>
-              <a:t>3/21/2017</a:t>
+              <a:t>5/31/2017</a:t>
             </a:fld>
             <a:endParaRPr lang="en-US"/>
           </a:p>
@@ -1413,7 +1413,7 @@
           <a:p>
             <a:fld id="{78C97017-6FC3-485B-9764-EAC9E56C1D49}" type="datetimeFigureOut">
               <a:rPr lang="en-US" smtClean="0"/>
-              <a:t>3/21/2017</a:t>
+              <a:t>5/31/2017</a:t>
             </a:fld>
             <a:endParaRPr lang="en-US"/>
           </a:p>
@@ -1698,7 +1698,7 @@
           <a:p>
             <a:fld id="{78C97017-6FC3-485B-9764-EAC9E56C1D49}" type="datetimeFigureOut">
               <a:rPr lang="en-US" smtClean="0"/>
-              <a:t>3/21/2017</a:t>
+              <a:t>5/31/2017</a:t>
             </a:fld>
             <a:endParaRPr lang="en-US"/>
           </a:p>
@@ -2117,7 +2117,7 @@
           <a:p>
             <a:fld id="{78C97017-6FC3-485B-9764-EAC9E56C1D49}" type="datetimeFigureOut">
               <a:rPr lang="en-US" smtClean="0"/>
-              <a:t>3/21/2017</a:t>
+              <a:t>5/31/2017</a:t>
             </a:fld>
             <a:endParaRPr lang="en-US"/>
           </a:p>
@@ -2234,7 +2234,7 @@
           <a:p>
             <a:fld id="{78C97017-6FC3-485B-9764-EAC9E56C1D49}" type="datetimeFigureOut">
               <a:rPr lang="en-US" smtClean="0"/>
-              <a:t>3/21/2017</a:t>
+              <a:t>5/31/2017</a:t>
             </a:fld>
             <a:endParaRPr lang="en-US"/>
           </a:p>
@@ -2329,7 +2329,7 @@
           <a:p>
             <a:fld id="{78C97017-6FC3-485B-9764-EAC9E56C1D49}" type="datetimeFigureOut">
               <a:rPr lang="en-US" smtClean="0"/>
-              <a:t>3/21/2017</a:t>
+              <a:t>5/31/2017</a:t>
             </a:fld>
             <a:endParaRPr lang="en-US"/>
           </a:p>
@@ -2604,7 +2604,7 @@
           <a:p>
             <a:fld id="{78C97017-6FC3-485B-9764-EAC9E56C1D49}" type="datetimeFigureOut">
               <a:rPr lang="en-US" smtClean="0"/>
-              <a:t>3/21/2017</a:t>
+              <a:t>5/31/2017</a:t>
             </a:fld>
             <a:endParaRPr lang="en-US"/>
           </a:p>
@@ -2856,7 +2856,7 @@
           <a:p>
             <a:fld id="{78C97017-6FC3-485B-9764-EAC9E56C1D49}" type="datetimeFigureOut">
               <a:rPr lang="en-US" smtClean="0"/>
-              <a:t>3/21/2017</a:t>
+              <a:t>5/31/2017</a:t>
             </a:fld>
             <a:endParaRPr lang="en-US"/>
           </a:p>
@@ -3067,7 +3067,7 @@
           <a:p>
             <a:fld id="{78C97017-6FC3-485B-9764-EAC9E56C1D49}" type="datetimeFigureOut">
               <a:rPr lang="en-US" smtClean="0"/>
-              <a:t>3/21/2017</a:t>
+              <a:t>5/31/2017</a:t>
             </a:fld>
             <a:endParaRPr lang="en-US"/>
           </a:p>
@@ -3921,27 +3921,12 @@
           <a:p>
             <a:pPr algn="ctr"/>
             <a:r>
-              <a:rPr lang="en-US" sz="1050" b="1" dirty="0">
+              <a:rPr lang="en-US" sz="1050" b="1" dirty="0" err="1">
                 <a:solidFill>
                   <a:srgbClr val="0070C0"/>
                 </a:solidFill>
               </a:rPr>
-              <a:t>Incorrect</a:t>
-            </a:r>
-            <a:br>
-              <a:rPr lang="en-US" sz="1050" b="1" dirty="0">
-                <a:solidFill>
-                  <a:srgbClr val="0070C0"/>
-                </a:solidFill>
-              </a:rPr>
-            </a:br>
-            <a:r>
-              <a:rPr lang="en-US" sz="1050" b="1" dirty="0">
-                <a:solidFill>
-                  <a:srgbClr val="0070C0"/>
-                </a:solidFill>
-              </a:rPr>
-              <a:t>Command</a:t>
+              <a:t>HelpCommand</a:t>
             </a:r>
             <a:endParaRPr lang="en-SG" sz="1050" b="1" dirty="0">
               <a:solidFill>

</xml_diff>